<commit_message>
small addition to power point
</commit_message>
<xml_diff>
--- a/presentation.pptx
+++ b/presentation.pptx
@@ -24,6 +24,7 @@
     <p:sldId id="273" r:id="rId18"/>
     <p:sldId id="274" r:id="rId19"/>
     <p:sldId id="275" r:id="rId20"/>
+    <p:sldId id="276" r:id="rId21"/>
   </p:sldIdLst>
   <p:sldSz cx="12192000" cy="6858000"/>
   <p:notesSz cx="6858000" cy="9144000"/>
@@ -8911,6 +8912,641 @@
     <p:extLst>
       <p:ext uri="{BB962C8B-B14F-4D97-AF65-F5344CB8AC3E}">
         <p14:creationId xmlns:p14="http://schemas.microsoft.com/office/powerpoint/2010/main" val="4098668455"/>
+      </p:ext>
+    </p:extLst>
+  </p:cSld>
+  <p:clrMapOvr>
+    <a:masterClrMapping/>
+  </p:clrMapOvr>
+</p:sld>
+</file>
+
+<file path=ppt/slides/slide20.xml><?xml version="1.0" encoding="utf-8"?>
+<p:sld xmlns:a="http://schemas.openxmlformats.org/drawingml/2006/main" xmlns:r="http://schemas.openxmlformats.org/officeDocument/2006/relationships" xmlns:p="http://schemas.openxmlformats.org/presentationml/2006/main">
+  <p:cSld>
+    <p:bg>
+      <p:bgPr>
+        <a:solidFill>
+          <a:schemeClr val="bg1"/>
+        </a:solidFill>
+        <a:effectLst/>
+      </p:bgPr>
+    </p:bg>
+    <p:spTree>
+      <p:nvGrpSpPr>
+        <p:cNvPr id="1" name=""/>
+        <p:cNvGrpSpPr/>
+        <p:nvPr/>
+      </p:nvGrpSpPr>
+      <p:grpSpPr>
+        <a:xfrm>
+          <a:off x="0" y="0"/>
+          <a:ext cx="0" cy="0"/>
+          <a:chOff x="0" y="0"/>
+          <a:chExt cx="0" cy="0"/>
+        </a:xfrm>
+      </p:grpSpPr>
+      <p:sp useBgFill="1">
+        <p:nvSpPr>
+          <p:cNvPr id="7" name="Rectangle 6">
+            <a:extLst>
+              <a:ext uri="{FF2B5EF4-FFF2-40B4-BE49-F238E27FC236}">
+                <a16:creationId xmlns:a16="http://schemas.microsoft.com/office/drawing/2014/main" id="{FFD48BC7-DC40-47DE-87EE-9F4B6ECB9ABB}"/>
+              </a:ext>
+              <a:ext uri="{C183D7F6-B498-43B3-948B-1728B52AA6E4}">
+                <adec:decorative xmlns:adec="http://schemas.microsoft.com/office/drawing/2017/decorative" val="1"/>
+              </a:ext>
+            </a:extLst>
+          </p:cNvPr>
+          <p:cNvSpPr>
+            <a:spLocks noGrp="1" noRot="1" noChangeAspect="1" noMove="1" noResize="1" noEditPoints="1" noAdjustHandles="1" noChangeArrowheads="1" noChangeShapeType="1" noTextEdit="1"/>
+          </p:cNvSpPr>
+          <p:nvPr>
+            <p:extLst>
+              <p:ext uri="{386F3935-93C4-4BCD-93E2-E3B085C9AB24}">
+                <p16:designElem xmlns:p16="http://schemas.microsoft.com/office/powerpoint/2015/main" val="1"/>
+              </p:ext>
+            </p:extLst>
+          </p:nvPr>
+        </p:nvSpPr>
+        <p:spPr>
+          <a:xfrm>
+            <a:off x="0" y="0"/>
+            <a:ext cx="12192000" cy="6858000"/>
+          </a:xfrm>
+          <a:prstGeom prst="rect">
+            <a:avLst/>
+          </a:prstGeom>
+          <a:ln>
+            <a:noFill/>
+          </a:ln>
+        </p:spPr>
+        <p:style>
+          <a:lnRef idx="2">
+            <a:schemeClr val="accent1">
+              <a:shade val="50000"/>
+            </a:schemeClr>
+          </a:lnRef>
+          <a:fillRef idx="1">
+            <a:schemeClr val="accent1"/>
+          </a:fillRef>
+          <a:effectRef idx="0">
+            <a:schemeClr val="accent1"/>
+          </a:effectRef>
+          <a:fontRef idx="minor">
+            <a:schemeClr val="lt1"/>
+          </a:fontRef>
+        </p:style>
+        <p:txBody>
+          <a:bodyPr rtlCol="0" anchor="ctr"/>
+          <a:lstStyle/>
+          <a:p>
+            <a:pPr algn="ctr"/>
+            <a:endParaRPr lang="en-US"/>
+          </a:p>
+        </p:txBody>
+      </p:sp>
+      <p:sp useBgFill="1">
+        <p:nvSpPr>
+          <p:cNvPr id="9" name="Freeform: Shape 8">
+            <a:extLst>
+              <a:ext uri="{FF2B5EF4-FFF2-40B4-BE49-F238E27FC236}">
+                <a16:creationId xmlns:a16="http://schemas.microsoft.com/office/drawing/2014/main" id="{E502BBC7-2C76-46F3-BC24-5985BC13DB88}"/>
+              </a:ext>
+              <a:ext uri="{C183D7F6-B498-43B3-948B-1728B52AA6E4}">
+                <adec:decorative xmlns:adec="http://schemas.microsoft.com/office/drawing/2017/decorative" val="1"/>
+              </a:ext>
+            </a:extLst>
+          </p:cNvPr>
+          <p:cNvSpPr>
+            <a:spLocks noGrp="1" noRot="1" noChangeAspect="1" noMove="1" noResize="1" noEditPoints="1" noAdjustHandles="1" noChangeArrowheads="1" noChangeShapeType="1" noTextEdit="1"/>
+          </p:cNvSpPr>
+          <p:nvPr>
+            <p:extLst>
+              <p:ext uri="{386F3935-93C4-4BCD-93E2-E3B085C9AB24}">
+                <p16:designElem xmlns:p16="http://schemas.microsoft.com/office/powerpoint/2015/main" val="1"/>
+              </p:ext>
+            </p:extLst>
+          </p:nvPr>
+        </p:nvSpPr>
+        <p:spPr>
+          <a:xfrm>
+            <a:off x="1114425" y="0"/>
+            <a:ext cx="9963150" cy="6858000"/>
+          </a:xfrm>
+          <a:custGeom>
+            <a:avLst/>
+            <a:gdLst>
+              <a:gd name="connsiteX0" fmla="*/ 1595771 w 9963150"/>
+              <a:gd name="connsiteY0" fmla="*/ 0 h 6858000"/>
+              <a:gd name="connsiteX1" fmla="*/ 8367379 w 9963150"/>
+              <a:gd name="connsiteY1" fmla="*/ 0 h 6858000"/>
+              <a:gd name="connsiteX2" fmla="*/ 8504080 w 9963150"/>
+              <a:gd name="connsiteY2" fmla="*/ 130333 h 6858000"/>
+              <a:gd name="connsiteX3" fmla="*/ 9963150 w 9963150"/>
+              <a:gd name="connsiteY3" fmla="*/ 3652838 h 6858000"/>
+              <a:gd name="connsiteX4" fmla="*/ 8825600 w 9963150"/>
+              <a:gd name="connsiteY4" fmla="*/ 6821583 h 6858000"/>
+              <a:gd name="connsiteX5" fmla="*/ 8794055 w 9963150"/>
+              <a:gd name="connsiteY5" fmla="*/ 6858000 h 6858000"/>
+              <a:gd name="connsiteX6" fmla="*/ 1169096 w 9963150"/>
+              <a:gd name="connsiteY6" fmla="*/ 6858000 h 6858000"/>
+              <a:gd name="connsiteX7" fmla="*/ 1137550 w 9963150"/>
+              <a:gd name="connsiteY7" fmla="*/ 6821583 h 6858000"/>
+              <a:gd name="connsiteX8" fmla="*/ 0 w 9963150"/>
+              <a:gd name="connsiteY8" fmla="*/ 3652838 h 6858000"/>
+              <a:gd name="connsiteX9" fmla="*/ 1459070 w 9963150"/>
+              <a:gd name="connsiteY9" fmla="*/ 130333 h 6858000"/>
+            </a:gdLst>
+            <a:ahLst/>
+            <a:cxnLst>
+              <a:cxn ang="0">
+                <a:pos x="connsiteX0" y="connsiteY0"/>
+              </a:cxn>
+              <a:cxn ang="0">
+                <a:pos x="connsiteX1" y="connsiteY1"/>
+              </a:cxn>
+              <a:cxn ang="0">
+                <a:pos x="connsiteX2" y="connsiteY2"/>
+              </a:cxn>
+              <a:cxn ang="0">
+                <a:pos x="connsiteX3" y="connsiteY3"/>
+              </a:cxn>
+              <a:cxn ang="0">
+                <a:pos x="connsiteX4" y="connsiteY4"/>
+              </a:cxn>
+              <a:cxn ang="0">
+                <a:pos x="connsiteX5" y="connsiteY5"/>
+              </a:cxn>
+              <a:cxn ang="0">
+                <a:pos x="connsiteX6" y="connsiteY6"/>
+              </a:cxn>
+              <a:cxn ang="0">
+                <a:pos x="connsiteX7" y="connsiteY7"/>
+              </a:cxn>
+              <a:cxn ang="0">
+                <a:pos x="connsiteX8" y="connsiteY8"/>
+              </a:cxn>
+              <a:cxn ang="0">
+                <a:pos x="connsiteX9" y="connsiteY9"/>
+              </a:cxn>
+            </a:cxnLst>
+            <a:rect l="l" t="t" r="r" b="b"/>
+            <a:pathLst>
+              <a:path w="9963150" h="6858000">
+                <a:moveTo>
+                  <a:pt x="1595771" y="0"/>
+                </a:moveTo>
+                <a:lnTo>
+                  <a:pt x="8367379" y="0"/>
+                </a:lnTo>
+                <a:lnTo>
+                  <a:pt x="8504080" y="130333"/>
+                </a:lnTo>
+                <a:cubicBezTo>
+                  <a:pt x="9405568" y="1031820"/>
+                  <a:pt x="9963150" y="2277214"/>
+                  <a:pt x="9963150" y="3652838"/>
+                </a:cubicBezTo>
+                <a:cubicBezTo>
+                  <a:pt x="9963150" y="4856509"/>
+                  <a:pt x="9536251" y="5960473"/>
+                  <a:pt x="8825600" y="6821583"/>
+                </a:cubicBezTo>
+                <a:lnTo>
+                  <a:pt x="8794055" y="6858000"/>
+                </a:lnTo>
+                <a:lnTo>
+                  <a:pt x="1169096" y="6858000"/>
+                </a:lnTo>
+                <a:lnTo>
+                  <a:pt x="1137550" y="6821583"/>
+                </a:lnTo>
+                <a:cubicBezTo>
+                  <a:pt x="426899" y="5960473"/>
+                  <a:pt x="0" y="4856509"/>
+                  <a:pt x="0" y="3652838"/>
+                </a:cubicBezTo>
+                <a:cubicBezTo>
+                  <a:pt x="0" y="2277214"/>
+                  <a:pt x="557582" y="1031820"/>
+                  <a:pt x="1459070" y="130333"/>
+                </a:cubicBezTo>
+                <a:close/>
+              </a:path>
+            </a:pathLst>
+          </a:custGeom>
+          <a:ln w="9525">
+            <a:solidFill>
+              <a:srgbClr val="EFEFEF"/>
+            </a:solidFill>
+          </a:ln>
+          <a:effectLst>
+            <a:outerShdw blurRad="139700" sx="102000" sy="102000" algn="ctr" rotWithShape="0">
+              <a:schemeClr val="bg1">
+                <a:lumMod val="85000"/>
+                <a:alpha val="38000"/>
+              </a:schemeClr>
+            </a:outerShdw>
+          </a:effectLst>
+        </p:spPr>
+        <p:style>
+          <a:lnRef idx="2">
+            <a:schemeClr val="accent1">
+              <a:shade val="50000"/>
+            </a:schemeClr>
+          </a:lnRef>
+          <a:fillRef idx="1">
+            <a:schemeClr val="accent1"/>
+          </a:fillRef>
+          <a:effectRef idx="0">
+            <a:schemeClr val="accent1"/>
+          </a:effectRef>
+          <a:fontRef idx="minor">
+            <a:schemeClr val="lt1"/>
+          </a:fontRef>
+        </p:style>
+        <p:txBody>
+          <a:bodyPr wrap="square" rtlCol="0" anchor="ctr">
+            <a:noAutofit/>
+          </a:bodyPr>
+          <a:lstStyle/>
+          <a:p>
+            <a:pPr marL="0" marR="0" lvl="0" indent="0" algn="ctr" defTabSz="914400" rtl="0" eaLnBrk="1" fontAlgn="auto" latinLnBrk="0" hangingPunct="1">
+              <a:lnSpc>
+                <a:spcPct val="100000"/>
+              </a:lnSpc>
+              <a:spcBef>
+                <a:spcPts val="0"/>
+              </a:spcBef>
+              <a:spcAft>
+                <a:spcPts val="0"/>
+              </a:spcAft>
+              <a:buClrTx/>
+              <a:buSzTx/>
+              <a:buFontTx/>
+              <a:buNone/>
+              <a:tabLst/>
+              <a:defRPr/>
+            </a:pPr>
+            <a:endParaRPr kumimoji="0" lang="en-US" sz="1800" b="0" i="0" u="none" strike="noStrike" kern="1200" cap="none" spc="0" normalizeH="0" baseline="0" noProof="0">
+              <a:ln>
+                <a:noFill/>
+              </a:ln>
+              <a:solidFill>
+                <a:prstClr val="white"/>
+              </a:solidFill>
+              <a:effectLst/>
+              <a:uLnTx/>
+              <a:uFillTx/>
+              <a:latin typeface="Calibri" panose="020F0502020204030204"/>
+              <a:ea typeface="+mn-ea"/>
+              <a:cs typeface="+mn-cs"/>
+            </a:endParaRPr>
+          </a:p>
+        </p:txBody>
+      </p:sp>
+      <p:sp useBgFill="1">
+        <p:nvSpPr>
+          <p:cNvPr id="11" name="Freeform: Shape 10">
+            <a:extLst>
+              <a:ext uri="{FF2B5EF4-FFF2-40B4-BE49-F238E27FC236}">
+                <a16:creationId xmlns:a16="http://schemas.microsoft.com/office/drawing/2014/main" id="{C7F28D52-2A5F-4D23-81AE-7CB8B591C7AF}"/>
+              </a:ext>
+              <a:ext uri="{C183D7F6-B498-43B3-948B-1728B52AA6E4}">
+                <adec:decorative xmlns:adec="http://schemas.microsoft.com/office/drawing/2017/decorative" val="1"/>
+              </a:ext>
+            </a:extLst>
+          </p:cNvPr>
+          <p:cNvSpPr>
+            <a:spLocks noGrp="1" noRot="1" noChangeAspect="1" noMove="1" noResize="1" noEditPoints="1" noAdjustHandles="1" noChangeArrowheads="1" noChangeShapeType="1" noTextEdit="1"/>
+          </p:cNvSpPr>
+          <p:nvPr>
+            <p:extLst>
+              <p:ext uri="{386F3935-93C4-4BCD-93E2-E3B085C9AB24}">
+                <p16:designElem xmlns:p16="http://schemas.microsoft.com/office/powerpoint/2015/main" val="1"/>
+              </p:ext>
+            </p:extLst>
+          </p:nvPr>
+        </p:nvSpPr>
+        <p:spPr>
+          <a:xfrm>
+            <a:off x="1121664" y="0"/>
+            <a:ext cx="9948672" cy="6858000"/>
+          </a:xfrm>
+          <a:custGeom>
+            <a:avLst/>
+            <a:gdLst>
+              <a:gd name="connsiteX0" fmla="*/ 1595771 w 9963150"/>
+              <a:gd name="connsiteY0" fmla="*/ 0 h 6858000"/>
+              <a:gd name="connsiteX1" fmla="*/ 8367379 w 9963150"/>
+              <a:gd name="connsiteY1" fmla="*/ 0 h 6858000"/>
+              <a:gd name="connsiteX2" fmla="*/ 8504080 w 9963150"/>
+              <a:gd name="connsiteY2" fmla="*/ 130333 h 6858000"/>
+              <a:gd name="connsiteX3" fmla="*/ 9963150 w 9963150"/>
+              <a:gd name="connsiteY3" fmla="*/ 3652838 h 6858000"/>
+              <a:gd name="connsiteX4" fmla="*/ 8825600 w 9963150"/>
+              <a:gd name="connsiteY4" fmla="*/ 6821583 h 6858000"/>
+              <a:gd name="connsiteX5" fmla="*/ 8794055 w 9963150"/>
+              <a:gd name="connsiteY5" fmla="*/ 6858000 h 6858000"/>
+              <a:gd name="connsiteX6" fmla="*/ 1169096 w 9963150"/>
+              <a:gd name="connsiteY6" fmla="*/ 6858000 h 6858000"/>
+              <a:gd name="connsiteX7" fmla="*/ 1137550 w 9963150"/>
+              <a:gd name="connsiteY7" fmla="*/ 6821583 h 6858000"/>
+              <a:gd name="connsiteX8" fmla="*/ 0 w 9963150"/>
+              <a:gd name="connsiteY8" fmla="*/ 3652838 h 6858000"/>
+              <a:gd name="connsiteX9" fmla="*/ 1459070 w 9963150"/>
+              <a:gd name="connsiteY9" fmla="*/ 130333 h 6858000"/>
+            </a:gdLst>
+            <a:ahLst/>
+            <a:cxnLst>
+              <a:cxn ang="0">
+                <a:pos x="connsiteX0" y="connsiteY0"/>
+              </a:cxn>
+              <a:cxn ang="0">
+                <a:pos x="connsiteX1" y="connsiteY1"/>
+              </a:cxn>
+              <a:cxn ang="0">
+                <a:pos x="connsiteX2" y="connsiteY2"/>
+              </a:cxn>
+              <a:cxn ang="0">
+                <a:pos x="connsiteX3" y="connsiteY3"/>
+              </a:cxn>
+              <a:cxn ang="0">
+                <a:pos x="connsiteX4" y="connsiteY4"/>
+              </a:cxn>
+              <a:cxn ang="0">
+                <a:pos x="connsiteX5" y="connsiteY5"/>
+              </a:cxn>
+              <a:cxn ang="0">
+                <a:pos x="connsiteX6" y="connsiteY6"/>
+              </a:cxn>
+              <a:cxn ang="0">
+                <a:pos x="connsiteX7" y="connsiteY7"/>
+              </a:cxn>
+              <a:cxn ang="0">
+                <a:pos x="connsiteX8" y="connsiteY8"/>
+              </a:cxn>
+              <a:cxn ang="0">
+                <a:pos x="connsiteX9" y="connsiteY9"/>
+              </a:cxn>
+            </a:cxnLst>
+            <a:rect l="l" t="t" r="r" b="b"/>
+            <a:pathLst>
+              <a:path w="9963150" h="6858000">
+                <a:moveTo>
+                  <a:pt x="1595771" y="0"/>
+                </a:moveTo>
+                <a:lnTo>
+                  <a:pt x="8367379" y="0"/>
+                </a:lnTo>
+                <a:lnTo>
+                  <a:pt x="8504080" y="130333"/>
+                </a:lnTo>
+                <a:cubicBezTo>
+                  <a:pt x="9405568" y="1031820"/>
+                  <a:pt x="9963150" y="2277214"/>
+                  <a:pt x="9963150" y="3652838"/>
+                </a:cubicBezTo>
+                <a:cubicBezTo>
+                  <a:pt x="9963150" y="4856509"/>
+                  <a:pt x="9536251" y="5960473"/>
+                  <a:pt x="8825600" y="6821583"/>
+                </a:cubicBezTo>
+                <a:lnTo>
+                  <a:pt x="8794055" y="6858000"/>
+                </a:lnTo>
+                <a:lnTo>
+                  <a:pt x="1169096" y="6858000"/>
+                </a:lnTo>
+                <a:lnTo>
+                  <a:pt x="1137550" y="6821583"/>
+                </a:lnTo>
+                <a:cubicBezTo>
+                  <a:pt x="426899" y="5960473"/>
+                  <a:pt x="0" y="4856509"/>
+                  <a:pt x="0" y="3652838"/>
+                </a:cubicBezTo>
+                <a:cubicBezTo>
+                  <a:pt x="0" y="2277214"/>
+                  <a:pt x="557582" y="1031820"/>
+                  <a:pt x="1459070" y="130333"/>
+                </a:cubicBezTo>
+                <a:close/>
+              </a:path>
+            </a:pathLst>
+          </a:custGeom>
+          <a:ln w="9525">
+            <a:noFill/>
+          </a:ln>
+          <a:effectLst/>
+        </p:spPr>
+        <p:style>
+          <a:lnRef idx="2">
+            <a:schemeClr val="accent1">
+              <a:shade val="50000"/>
+            </a:schemeClr>
+          </a:lnRef>
+          <a:fillRef idx="1">
+            <a:schemeClr val="accent1"/>
+          </a:fillRef>
+          <a:effectRef idx="0">
+            <a:schemeClr val="accent1"/>
+          </a:effectRef>
+          <a:fontRef idx="minor">
+            <a:schemeClr val="lt1"/>
+          </a:fontRef>
+        </p:style>
+        <p:txBody>
+          <a:bodyPr wrap="square" rtlCol="0" anchor="ctr">
+            <a:noAutofit/>
+          </a:bodyPr>
+          <a:lstStyle/>
+          <a:p>
+            <a:pPr marL="0" marR="0" lvl="0" indent="0" algn="ctr" defTabSz="914400" rtl="0" eaLnBrk="1" fontAlgn="auto" latinLnBrk="0" hangingPunct="1">
+              <a:lnSpc>
+                <a:spcPct val="100000"/>
+              </a:lnSpc>
+              <a:spcBef>
+                <a:spcPts val="0"/>
+              </a:spcBef>
+              <a:spcAft>
+                <a:spcPts val="0"/>
+              </a:spcAft>
+              <a:buClrTx/>
+              <a:buSzTx/>
+              <a:buFontTx/>
+              <a:buNone/>
+              <a:tabLst/>
+              <a:defRPr/>
+            </a:pPr>
+            <a:endParaRPr kumimoji="0" lang="en-US" sz="1800" b="0" i="0" u="none" strike="noStrike" kern="1200" cap="none" spc="0" normalizeH="0" baseline="0" noProof="0">
+              <a:ln>
+                <a:noFill/>
+              </a:ln>
+              <a:solidFill>
+                <a:prstClr val="white"/>
+              </a:solidFill>
+              <a:effectLst/>
+              <a:uLnTx/>
+              <a:uFillTx/>
+              <a:latin typeface="Calibri" panose="020F0502020204030204"/>
+              <a:ea typeface="+mn-ea"/>
+              <a:cs typeface="+mn-cs"/>
+            </a:endParaRPr>
+          </a:p>
+        </p:txBody>
+      </p:sp>
+      <p:sp>
+        <p:nvSpPr>
+          <p:cNvPr id="2" name="Τίτλος 1">
+            <a:extLst>
+              <a:ext uri="{FF2B5EF4-FFF2-40B4-BE49-F238E27FC236}">
+                <a16:creationId xmlns:a16="http://schemas.microsoft.com/office/drawing/2014/main" id="{9AD9F9E3-7B7C-F307-6A3B-1CC02523B977}"/>
+              </a:ext>
+            </a:extLst>
+          </p:cNvPr>
+          <p:cNvSpPr>
+            <a:spLocks noGrp="1"/>
+          </p:cNvSpPr>
+          <p:nvPr>
+            <p:ph type="title"/>
+          </p:nvPr>
+        </p:nvSpPr>
+        <p:spPr>
+          <a:xfrm>
+            <a:off x="1524003" y="1999615"/>
+            <a:ext cx="9144000" cy="2764028"/>
+          </a:xfrm>
+        </p:spPr>
+        <p:txBody>
+          <a:bodyPr vert="horz" lIns="91440" tIns="45720" rIns="91440" bIns="45720" rtlCol="0" anchor="ctr">
+            <a:normAutofit/>
+          </a:bodyPr>
+          <a:lstStyle/>
+          <a:p>
+            <a:pPr algn="ctr"/>
+            <a:r>
+              <a:rPr lang="en-US" sz="7200" kern="1200" dirty="0" err="1">
+                <a:solidFill>
+                  <a:schemeClr val="tx1"/>
+                </a:solidFill>
+                <a:latin typeface="+mj-lt"/>
+                <a:ea typeface="+mj-ea"/>
+                <a:cs typeface="+mj-cs"/>
+              </a:rPr>
+              <a:t>Ευχ</a:t>
+            </a:r>
+            <a:r>
+              <a:rPr lang="en-US" sz="7200" kern="1200" dirty="0">
+                <a:solidFill>
+                  <a:schemeClr val="tx1"/>
+                </a:solidFill>
+                <a:latin typeface="+mj-lt"/>
+                <a:ea typeface="+mj-ea"/>
+                <a:cs typeface="+mj-cs"/>
+              </a:rPr>
+              <a:t>αριστώ για την προσοχή σας</a:t>
+            </a:r>
+          </a:p>
+        </p:txBody>
+      </p:sp>
+      <p:sp>
+        <p:nvSpPr>
+          <p:cNvPr id="13" name="Rectangle 12">
+            <a:extLst>
+              <a:ext uri="{FF2B5EF4-FFF2-40B4-BE49-F238E27FC236}">
+                <a16:creationId xmlns:a16="http://schemas.microsoft.com/office/drawing/2014/main" id="{3629484E-3792-4B3D-89AD-7C8A1ED0E0D4}"/>
+              </a:ext>
+              <a:ext uri="{C183D7F6-B498-43B3-948B-1728B52AA6E4}">
+                <adec:decorative xmlns:adec="http://schemas.microsoft.com/office/drawing/2017/decorative" val="1"/>
+              </a:ext>
+            </a:extLst>
+          </p:cNvPr>
+          <p:cNvSpPr>
+            <a:spLocks noGrp="1" noRot="1" noChangeAspect="1" noMove="1" noResize="1" noEditPoints="1" noAdjustHandles="1" noChangeArrowheads="1" noChangeShapeType="1" noTextEdit="1"/>
+          </p:cNvSpPr>
+          <p:nvPr>
+            <p:extLst>
+              <p:ext uri="{386F3935-93C4-4BCD-93E2-E3B085C9AB24}">
+                <p16:designElem xmlns:p16="http://schemas.microsoft.com/office/powerpoint/2015/main" val="1"/>
+              </p:ext>
+            </p:extLst>
+          </p:nvPr>
+        </p:nvSpPr>
+        <p:spPr>
+          <a:xfrm>
+            <a:off x="3718560" y="5524786"/>
+            <a:ext cx="4754880" cy="27432"/>
+          </a:xfrm>
+          <a:prstGeom prst="rect">
+            <a:avLst/>
+          </a:prstGeom>
+          <a:solidFill>
+            <a:schemeClr val="accent2"/>
+          </a:solidFill>
+          <a:ln>
+            <a:noFill/>
+          </a:ln>
+        </p:spPr>
+        <p:style>
+          <a:lnRef idx="2">
+            <a:schemeClr val="accent1">
+              <a:shade val="50000"/>
+            </a:schemeClr>
+          </a:lnRef>
+          <a:fillRef idx="1">
+            <a:schemeClr val="accent1"/>
+          </a:fillRef>
+          <a:effectRef idx="0">
+            <a:schemeClr val="accent1"/>
+          </a:effectRef>
+          <a:fontRef idx="minor">
+            <a:schemeClr val="lt1"/>
+          </a:fontRef>
+        </p:style>
+        <p:txBody>
+          <a:bodyPr rtlCol="0" anchor="ctr"/>
+          <a:lstStyle/>
+          <a:p>
+            <a:pPr marL="0" marR="0" lvl="0" indent="0" algn="ctr" defTabSz="914400" rtl="0" eaLnBrk="1" fontAlgn="auto" latinLnBrk="0" hangingPunct="1">
+              <a:lnSpc>
+                <a:spcPct val="100000"/>
+              </a:lnSpc>
+              <a:spcBef>
+                <a:spcPts val="0"/>
+              </a:spcBef>
+              <a:spcAft>
+                <a:spcPts val="0"/>
+              </a:spcAft>
+              <a:buClrTx/>
+              <a:buSzTx/>
+              <a:buFontTx/>
+              <a:buNone/>
+              <a:tabLst/>
+              <a:defRPr/>
+            </a:pPr>
+            <a:endParaRPr kumimoji="0" lang="en-US" sz="1800" b="0" i="0" u="none" strike="noStrike" kern="1200" cap="none" spc="0" normalizeH="0" baseline="0" noProof="0">
+              <a:ln>
+                <a:noFill/>
+              </a:ln>
+              <a:solidFill>
+                <a:prstClr val="white"/>
+              </a:solidFill>
+              <a:effectLst/>
+              <a:uLnTx/>
+              <a:uFillTx/>
+              <a:latin typeface="Calibri" panose="020F0502020204030204"/>
+              <a:ea typeface="+mn-ea"/>
+              <a:cs typeface="+mn-cs"/>
+            </a:endParaRPr>
+          </a:p>
+        </p:txBody>
+      </p:sp>
+    </p:spTree>
+    <p:extLst>
+      <p:ext uri="{BB962C8B-B14F-4D97-AF65-F5344CB8AC3E}">
+        <p14:creationId xmlns:p14="http://schemas.microsoft.com/office/powerpoint/2010/main" val="1920385229"/>
       </p:ext>
     </p:extLst>
   </p:cSld>

</xml_diff>